<commit_message>
Material de la primera reunión de la red temática
</commit_message>
<xml_diff>
--- a/01.kickoff-Madrid/Day1_10_PlanificaciónActividades.pptx
+++ b/01.kickoff-Madrid/Day1_10_PlanificaciónActividades.pptx
@@ -9,8 +9,9 @@
     <p:sldId id="258" r:id="rId3"/>
     <p:sldId id="274" r:id="rId4"/>
     <p:sldId id="277" r:id="rId5"/>
-    <p:sldId id="276" r:id="rId6"/>
-    <p:sldId id="275" r:id="rId7"/>
+    <p:sldId id="278" r:id="rId6"/>
+    <p:sldId id="276" r:id="rId7"/>
+    <p:sldId id="275" r:id="rId8"/>
   </p:sldIdLst>
   <p:sldSz cx="9144000" cy="6858000" type="screen4x3"/>
   <p:notesSz cx="6858000" cy="9144000"/>
@@ -831,7 +832,7 @@
           <a:p>
             <a:fld id="{479A6A7B-4509-854D-860D-66B008F635B4}" type="datetimeFigureOut">
               <a:rPr lang="es-ES" smtClean="0"/>
-              <a:t>16/2/16</a:t>
+              <a:t>17/2/16</a:t>
             </a:fld>
             <a:endParaRPr lang="es-ES"/>
           </a:p>
@@ -1374,7 +1375,7 @@
           <a:p>
             <a:fld id="{479A6A7B-4509-854D-860D-66B008F635B4}" type="datetimeFigureOut">
               <a:rPr lang="es-ES" smtClean="0"/>
-              <a:t>16/2/16</a:t>
+              <a:t>17/2/16</a:t>
             </a:fld>
             <a:endParaRPr lang="es-ES"/>
           </a:p>
@@ -1510,7 +1511,7 @@
           <a:p>
             <a:fld id="{479A6A7B-4509-854D-860D-66B008F635B4}" type="datetimeFigureOut">
               <a:rPr lang="es-ES" smtClean="0"/>
-              <a:t>16/2/16</a:t>
+              <a:t>17/2/16</a:t>
             </a:fld>
             <a:endParaRPr lang="es-ES"/>
           </a:p>
@@ -1848,7 +1849,7 @@
           <a:p>
             <a:fld id="{479A6A7B-4509-854D-860D-66B008F635B4}" type="datetimeFigureOut">
               <a:rPr lang="es-ES" smtClean="0"/>
-              <a:t>16/2/16</a:t>
+              <a:t>17/2/16</a:t>
             </a:fld>
             <a:endParaRPr lang="es-ES"/>
           </a:p>
@@ -2174,7 +2175,7 @@
           <a:p>
             <a:fld id="{479A6A7B-4509-854D-860D-66B008F635B4}" type="datetimeFigureOut">
               <a:rPr lang="es-ES" smtClean="0"/>
-              <a:t>16/2/16</a:t>
+              <a:t>17/2/16</a:t>
             </a:fld>
             <a:endParaRPr lang="es-ES"/>
           </a:p>
@@ -2472,7 +2473,7 @@
           <a:p>
             <a:fld id="{479A6A7B-4509-854D-860D-66B008F635B4}" type="datetimeFigureOut">
               <a:rPr lang="es-ES" smtClean="0"/>
-              <a:t>16/2/16</a:t>
+              <a:t>17/2/16</a:t>
             </a:fld>
             <a:endParaRPr lang="es-ES"/>
           </a:p>
@@ -2859,7 +2860,7 @@
           <a:p>
             <a:fld id="{479A6A7B-4509-854D-860D-66B008F635B4}" type="datetimeFigureOut">
               <a:rPr lang="es-ES" smtClean="0"/>
-              <a:t>16/2/16</a:t>
+              <a:t>17/2/16</a:t>
             </a:fld>
             <a:endParaRPr lang="es-ES"/>
           </a:p>
@@ -3279,7 +3280,7 @@
           <a:p>
             <a:fld id="{479A6A7B-4509-854D-860D-66B008F635B4}" type="datetimeFigureOut">
               <a:rPr lang="es-ES" smtClean="0"/>
-              <a:t>16/2/16</a:t>
+              <a:t>17/2/16</a:t>
             </a:fld>
             <a:endParaRPr lang="es-ES"/>
           </a:p>
@@ -3827,7 +3828,7 @@
           <a:p>
             <a:fld id="{479A6A7B-4509-854D-860D-66B008F635B4}" type="datetimeFigureOut">
               <a:rPr lang="es-ES" smtClean="0"/>
-              <a:t>16/2/16</a:t>
+              <a:t>17/2/16</a:t>
             </a:fld>
             <a:endParaRPr lang="es-ES"/>
           </a:p>
@@ -4185,7 +4186,7 @@
           <a:p>
             <a:fld id="{479A6A7B-4509-854D-860D-66B008F635B4}" type="datetimeFigureOut">
               <a:rPr lang="es-ES" smtClean="0"/>
-              <a:t>16/2/16</a:t>
+              <a:t>17/2/16</a:t>
             </a:fld>
             <a:endParaRPr lang="es-ES"/>
           </a:p>
@@ -4400,7 +4401,7 @@
           <a:p>
             <a:fld id="{479A6A7B-4509-854D-860D-66B008F635B4}" type="datetimeFigureOut">
               <a:rPr lang="es-ES" smtClean="0"/>
-              <a:t>16/2/16</a:t>
+              <a:t>17/2/16</a:t>
             </a:fld>
             <a:endParaRPr lang="es-ES"/>
           </a:p>
@@ -4712,7 +4713,7 @@
           <a:p>
             <a:fld id="{479A6A7B-4509-854D-860D-66B008F635B4}" type="datetimeFigureOut">
               <a:rPr lang="es-ES" smtClean="0"/>
-              <a:t>16/2/16</a:t>
+              <a:t>17/2/16</a:t>
             </a:fld>
             <a:endParaRPr lang="es-ES"/>
           </a:p>
@@ -4968,7 +4969,7 @@
           <a:p>
             <a:fld id="{479A6A7B-4509-854D-860D-66B008F635B4}" type="datetimeFigureOut">
               <a:rPr lang="es-ES" smtClean="0"/>
-              <a:t>16/2/16</a:t>
+              <a:t>17/2/16</a:t>
             </a:fld>
             <a:endParaRPr lang="es-ES"/>
           </a:p>
@@ -5357,7 +5358,7 @@
           <a:p>
             <a:fld id="{479A6A7B-4509-854D-860D-66B008F635B4}" type="datetimeFigureOut">
               <a:rPr lang="es-ES" smtClean="0"/>
-              <a:t>16/2/16</a:t>
+              <a:t>17/2/16</a:t>
             </a:fld>
             <a:endParaRPr lang="es-ES"/>
           </a:p>
@@ -5946,7 +5947,7 @@
           <a:p>
             <a:fld id="{479A6A7B-4509-854D-860D-66B008F635B4}" type="datetimeFigureOut">
               <a:rPr lang="es-ES" smtClean="0"/>
-              <a:t>16/2/16</a:t>
+              <a:t>17/2/16</a:t>
             </a:fld>
             <a:endParaRPr lang="es-ES"/>
           </a:p>
@@ -6461,7 +6462,7 @@
           <a:p>
             <a:fld id="{479A6A7B-4509-854D-860D-66B008F635B4}" type="datetimeFigureOut">
               <a:rPr lang="es-ES" smtClean="0"/>
-              <a:t>16/2/16</a:t>
+              <a:t>17/2/16</a:t>
             </a:fld>
             <a:endParaRPr lang="es-ES"/>
           </a:p>
@@ -6834,7 +6835,7 @@
           <a:p>
             <a:fld id="{479A6A7B-4509-854D-860D-66B008F635B4}" type="datetimeFigureOut">
               <a:rPr lang="es-ES" smtClean="0"/>
-              <a:t>16/2/16</a:t>
+              <a:t>17/2/16</a:t>
             </a:fld>
             <a:endParaRPr lang="es-ES"/>
           </a:p>
@@ -7233,7 +7234,7 @@
           <a:p>
             <a:fld id="{479A6A7B-4509-854D-860D-66B008F635B4}" type="datetimeFigureOut">
               <a:rPr lang="es-ES" smtClean="0"/>
-              <a:t>16/2/16</a:t>
+              <a:t>17/2/16</a:t>
             </a:fld>
             <a:endParaRPr lang="es-ES"/>
           </a:p>
@@ -7653,7 +7654,7 @@
           <a:p>
             <a:fld id="{479A6A7B-4509-854D-860D-66B008F635B4}" type="datetimeFigureOut">
               <a:rPr lang="es-ES" smtClean="0"/>
-              <a:t>16/2/16</a:t>
+              <a:t>17/2/16</a:t>
             </a:fld>
             <a:endParaRPr lang="es-ES"/>
           </a:p>
@@ -8036,7 +8037,7 @@
           <a:p>
             <a:fld id="{479A6A7B-4509-854D-860D-66B008F635B4}" type="datetimeFigureOut">
               <a:rPr lang="es-ES" smtClean="0"/>
-              <a:t>16/2/16</a:t>
+              <a:t>17/2/16</a:t>
             </a:fld>
             <a:endParaRPr lang="es-ES"/>
           </a:p>
@@ -8542,11 +8543,7 @@
           <a:p>
             <a:r>
               <a:rPr lang="es-ES" dirty="0" smtClean="0"/>
-              <a:t>Planificaci</a:t>
-            </a:r>
-            <a:r>
-              <a:rPr lang="es-ES" dirty="0" smtClean="0"/>
-              <a:t>ón de actividades</a:t>
+              <a:t>Planificación de actividades</a:t>
             </a:r>
             <a:endParaRPr lang="es-ES" dirty="0"/>
           </a:p>
@@ -8684,11 +8681,7 @@
             </a:r>
             <a:r>
               <a:rPr lang="es-ES" dirty="0" smtClean="0"/>
-              <a:t> cient</a:t>
-            </a:r>
-            <a:r>
-              <a:rPr lang="es-ES" dirty="0" smtClean="0"/>
-              <a:t>íficos</a:t>
+              <a:t> científicos</a:t>
             </a:r>
           </a:p>
           <a:p>
@@ -8952,23 +8945,14 @@
             </a:r>
             <a:r>
               <a:rPr lang="es-ES" dirty="0" smtClean="0"/>
-              <a:t>? ¿Qu</a:t>
-            </a:r>
+              <a:t>? ¿Qué están haciendo otras redes?</a:t>
+            </a:r>
+          </a:p>
+          <a:p>
+            <a:pPr lvl="1"/>
             <a:r>
               <a:rPr lang="es-ES" dirty="0" smtClean="0"/>
-              <a:t>é están haciendo otras redes?</a:t>
-            </a:r>
-            <a:endParaRPr lang="es-ES" dirty="0" smtClean="0"/>
-          </a:p>
-          <a:p>
-            <a:pPr lvl="1"/>
-            <a:r>
-              <a:rPr lang="es-ES" dirty="0" smtClean="0"/>
-              <a:t>¿Alguna otra en alg</a:t>
-            </a:r>
-            <a:r>
-              <a:rPr lang="es-ES" dirty="0" smtClean="0"/>
-              <a:t>ún otro sitio de España?</a:t>
+              <a:t>¿Alguna otra en algún otro sitio de España?</a:t>
             </a:r>
           </a:p>
           <a:p>
@@ -9103,11 +9087,7 @@
             <a:pPr lvl="1"/>
             <a:r>
               <a:rPr lang="es-ES" dirty="0" smtClean="0"/>
-              <a:t>¿Qu</a:t>
-            </a:r>
-            <a:r>
-              <a:rPr lang="es-ES" dirty="0" smtClean="0"/>
-              <a:t>é podemos ofrecer como premio?</a:t>
+              <a:t>¿Qué podemos ofrecer como premio?</a:t>
             </a:r>
             <a:endParaRPr lang="es-ES" dirty="0"/>
           </a:p>
@@ -9159,6 +9139,101 @@
           <a:lstStyle/>
           <a:p>
             <a:r>
+              <a:rPr lang="es-ES" dirty="0" err="1" smtClean="0"/>
+              <a:t>Mailing</a:t>
+            </a:r>
+            <a:r>
+              <a:rPr lang="es-ES" dirty="0" smtClean="0"/>
+              <a:t> </a:t>
+            </a:r>
+            <a:r>
+              <a:rPr lang="es-ES" dirty="0" err="1" smtClean="0"/>
+              <a:t>list</a:t>
+            </a:r>
+            <a:endParaRPr lang="es-ES" dirty="0"/>
+          </a:p>
+        </p:txBody>
+      </p:sp>
+      <p:sp>
+        <p:nvSpPr>
+          <p:cNvPr id="3" name="Marcador de contenido 2"/>
+          <p:cNvSpPr>
+            <a:spLocks noGrp="1"/>
+          </p:cNvSpPr>
+          <p:nvPr>
+            <p:ph idx="1"/>
+          </p:nvPr>
+        </p:nvSpPr>
+        <p:spPr/>
+        <p:txBody>
+          <a:bodyPr/>
+          <a:lstStyle/>
+          <a:p>
+            <a:r>
+              <a:rPr lang="es-ES" dirty="0" smtClean="0"/>
+              <a:t>¿La hacemos abierta?</a:t>
+            </a:r>
+          </a:p>
+          <a:p>
+            <a:pPr lvl="1"/>
+            <a:r>
+              <a:rPr lang="es-ES" dirty="0" smtClean="0"/>
+              <a:t>Revisar las peticiones que hay ahora </a:t>
+            </a:r>
+            <a:r>
+              <a:rPr lang="es-ES" smtClean="0"/>
+              <a:t>mismo pendientes</a:t>
+            </a:r>
+            <a:endParaRPr lang="es-ES" dirty="0"/>
+          </a:p>
+        </p:txBody>
+      </p:sp>
+    </p:spTree>
+    <p:extLst>
+      <p:ext uri="{BB962C8B-B14F-4D97-AF65-F5344CB8AC3E}">
+        <p14:creationId xmlns:p14="http://schemas.microsoft.com/office/powerpoint/2010/main" val="3268686270"/>
+      </p:ext>
+    </p:extLst>
+  </p:cSld>
+  <p:clrMapOvr>
+    <a:masterClrMapping/>
+  </p:clrMapOvr>
+</p:sld>
+</file>
+
+<file path=ppt/slides/slide6.xml><?xml version="1.0" encoding="utf-8"?>
+<p:sld xmlns:a="http://schemas.openxmlformats.org/drawingml/2006/main" xmlns:r="http://schemas.openxmlformats.org/officeDocument/2006/relationships" xmlns:p="http://schemas.openxmlformats.org/presentationml/2006/main">
+  <p:cSld>
+    <p:spTree>
+      <p:nvGrpSpPr>
+        <p:cNvPr id="1" name=""/>
+        <p:cNvGrpSpPr/>
+        <p:nvPr/>
+      </p:nvGrpSpPr>
+      <p:grpSpPr>
+        <a:xfrm>
+          <a:off x="0" y="0"/>
+          <a:ext cx="0" cy="0"/>
+          <a:chOff x="0" y="0"/>
+          <a:chExt cx="0" cy="0"/>
+        </a:xfrm>
+      </p:grpSpPr>
+      <p:sp>
+        <p:nvSpPr>
+          <p:cNvPr id="2" name="Título 1"/>
+          <p:cNvSpPr>
+            <a:spLocks noGrp="1"/>
+          </p:cNvSpPr>
+          <p:nvPr>
+            <p:ph type="title"/>
+          </p:nvPr>
+        </p:nvSpPr>
+        <p:spPr/>
+        <p:txBody>
+          <a:bodyPr/>
+          <a:lstStyle/>
+          <a:p>
+            <a:r>
               <a:rPr lang="es-ES" dirty="0" smtClean="0"/>
               <a:t>Movilidad</a:t>
             </a:r>
@@ -9183,11 +9258,7 @@
           <a:p>
             <a:r>
               <a:rPr lang="es-ES" dirty="0" smtClean="0"/>
-              <a:t>Se propusieron cuatro convocatorias p</a:t>
-            </a:r>
-            <a:r>
-              <a:rPr lang="es-ES" dirty="0" smtClean="0"/>
-              <a:t>úblicas, competitivas</a:t>
+              <a:t>Se propusieron cuatro convocatorias públicas, competitivas</a:t>
             </a:r>
           </a:p>
           <a:p>
@@ -9238,7 +9309,7 @@
 </p:sld>
 </file>
 
-<file path=ppt/slides/slide6.xml><?xml version="1.0" encoding="utf-8"?>
+<file path=ppt/slides/slide7.xml><?xml version="1.0" encoding="utf-8"?>
 <p:sld xmlns:a="http://schemas.openxmlformats.org/drawingml/2006/main" xmlns:r="http://schemas.openxmlformats.org/officeDocument/2006/relationships" xmlns:p="http://schemas.openxmlformats.org/presentationml/2006/main">
   <p:cSld>
     <p:spTree>

</xml_diff>